<commit_message>
Changes in TODO.txt and Presentation
</commit_message>
<xml_diff>
--- a/presentation.pptx
+++ b/presentation.pptx
@@ -10981,6 +10981,39 @@
               <a:rPr lang="en-US" sz="1600" dirty="0">
                 <a:latin typeface="Garamond" panose="02020404030301010803" pitchFamily="18" charset="0"/>
               </a:rPr>
+              <a:t>History section for manager’s UI to see past attendance, crowd levels and reviews.</a:t>
+            </a:r>
+          </a:p>
+          <a:p>
+            <a:pPr>
+              <a:buFont typeface="+mj-lt"/>
+              <a:buAutoNum type="arabicPeriod"/>
+            </a:pPr>
+            <a:r>
+              <a:rPr lang="en-US" sz="1600" dirty="0">
+                <a:latin typeface="Garamond" panose="02020404030301010803" pitchFamily="18" charset="0"/>
+              </a:rPr>
+              <a:t>History section for student’s UI to see their past attendance </a:t>
+            </a:r>
+            <a:r>
+              <a:rPr lang="en-US" sz="1600">
+                <a:latin typeface="Garamond" panose="02020404030301010803" pitchFamily="18" charset="0"/>
+              </a:rPr>
+              <a:t>and submitted reviews.</a:t>
+            </a:r>
+            <a:endParaRPr lang="en-US" sz="1600" dirty="0">
+              <a:latin typeface="Garamond" panose="02020404030301010803" pitchFamily="18" charset="0"/>
+            </a:endParaRPr>
+          </a:p>
+          <a:p>
+            <a:pPr>
+              <a:buFont typeface="+mj-lt"/>
+              <a:buAutoNum type="arabicPeriod"/>
+            </a:pPr>
+            <a:r>
+              <a:rPr lang="en-US" sz="1600" dirty="0">
+                <a:latin typeface="Garamond" panose="02020404030301010803" pitchFamily="18" charset="0"/>
+              </a:rPr>
               <a:t>Other Minor fixes:</a:t>
             </a:r>
           </a:p>

</xml_diff>